<commit_message>
add letters to cross validation subfigures (fig 6)
</commit_message>
<xml_diff>
--- a/figures/fringillidae-cross-validation/fig-cross-validation-xy-plots-diffs.pptx
+++ b/figures/fringillidae-cross-validation/fig-cross-validation-xy-plots-diffs.pptx
@@ -254,7 +254,7 @@
           <a:p>
             <a:fld id="{F26A468D-0533-8849-987E-F3D35C776C03}" type="datetimeFigureOut">
               <a:rPr lang="en-US" smtClean="0"/>
-              <a:t>4/7/22</a:t>
+              <a:t>6/7/23</a:t>
             </a:fld>
             <a:endParaRPr lang="en-US"/>
           </a:p>
@@ -424,7 +424,7 @@
           <a:p>
             <a:fld id="{F26A468D-0533-8849-987E-F3D35C776C03}" type="datetimeFigureOut">
               <a:rPr lang="en-US" smtClean="0"/>
-              <a:t>4/7/22</a:t>
+              <a:t>6/7/23</a:t>
             </a:fld>
             <a:endParaRPr lang="en-US"/>
           </a:p>
@@ -604,7 +604,7 @@
           <a:p>
             <a:fld id="{F26A468D-0533-8849-987E-F3D35C776C03}" type="datetimeFigureOut">
               <a:rPr lang="en-US" smtClean="0"/>
-              <a:t>4/7/22</a:t>
+              <a:t>6/7/23</a:t>
             </a:fld>
             <a:endParaRPr lang="en-US"/>
           </a:p>
@@ -774,7 +774,7 @@
           <a:p>
             <a:fld id="{F26A468D-0533-8849-987E-F3D35C776C03}" type="datetimeFigureOut">
               <a:rPr lang="en-US" smtClean="0"/>
-              <a:t>4/7/22</a:t>
+              <a:t>6/7/23</a:t>
             </a:fld>
             <a:endParaRPr lang="en-US"/>
           </a:p>
@@ -1018,7 +1018,7 @@
           <a:p>
             <a:fld id="{F26A468D-0533-8849-987E-F3D35C776C03}" type="datetimeFigureOut">
               <a:rPr lang="en-US" smtClean="0"/>
-              <a:t>4/7/22</a:t>
+              <a:t>6/7/23</a:t>
             </a:fld>
             <a:endParaRPr lang="en-US"/>
           </a:p>
@@ -1250,7 +1250,7 @@
           <a:p>
             <a:fld id="{F26A468D-0533-8849-987E-F3D35C776C03}" type="datetimeFigureOut">
               <a:rPr lang="en-US" smtClean="0"/>
-              <a:t>4/7/22</a:t>
+              <a:t>6/7/23</a:t>
             </a:fld>
             <a:endParaRPr lang="en-US"/>
           </a:p>
@@ -1617,7 +1617,7 @@
           <a:p>
             <a:fld id="{F26A468D-0533-8849-987E-F3D35C776C03}" type="datetimeFigureOut">
               <a:rPr lang="en-US" smtClean="0"/>
-              <a:t>4/7/22</a:t>
+              <a:t>6/7/23</a:t>
             </a:fld>
             <a:endParaRPr lang="en-US"/>
           </a:p>
@@ -1735,7 +1735,7 @@
           <a:p>
             <a:fld id="{F26A468D-0533-8849-987E-F3D35C776C03}" type="datetimeFigureOut">
               <a:rPr lang="en-US" smtClean="0"/>
-              <a:t>4/7/22</a:t>
+              <a:t>6/7/23</a:t>
             </a:fld>
             <a:endParaRPr lang="en-US"/>
           </a:p>
@@ -1830,7 +1830,7 @@
           <a:p>
             <a:fld id="{F26A468D-0533-8849-987E-F3D35C776C03}" type="datetimeFigureOut">
               <a:rPr lang="en-US" smtClean="0"/>
-              <a:t>4/7/22</a:t>
+              <a:t>6/7/23</a:t>
             </a:fld>
             <a:endParaRPr lang="en-US"/>
           </a:p>
@@ -2107,7 +2107,7 @@
           <a:p>
             <a:fld id="{F26A468D-0533-8849-987E-F3D35C776C03}" type="datetimeFigureOut">
               <a:rPr lang="en-US" smtClean="0"/>
-              <a:t>4/7/22</a:t>
+              <a:t>6/7/23</a:t>
             </a:fld>
             <a:endParaRPr lang="en-US"/>
           </a:p>
@@ -2364,7 +2364,7 @@
           <a:p>
             <a:fld id="{F26A468D-0533-8849-987E-F3D35C776C03}" type="datetimeFigureOut">
               <a:rPr lang="en-US" smtClean="0"/>
-              <a:t>4/7/22</a:t>
+              <a:t>6/7/23</a:t>
             </a:fld>
             <a:endParaRPr lang="en-US"/>
           </a:p>
@@ -2577,7 +2577,7 @@
           <a:p>
             <a:fld id="{F26A468D-0533-8849-987E-F3D35C776C03}" type="datetimeFigureOut">
               <a:rPr lang="en-US" smtClean="0"/>
-              <a:t>4/7/22</a:t>
+              <a:t>6/7/23</a:t>
             </a:fld>
             <a:endParaRPr lang="en-US"/>
           </a:p>
@@ -3004,7 +3004,7 @@
         </p:blipFill>
         <p:spPr>
           <a:xfrm>
-            <a:off x="0" y="0"/>
+            <a:off x="0" y="-13855"/>
             <a:ext cx="2286000" cy="2286000"/>
           </a:xfrm>
           <a:prstGeom prst="rect">
@@ -3034,7 +3034,7 @@
         </p:blipFill>
         <p:spPr>
           <a:xfrm>
-            <a:off x="2216729" y="0"/>
+            <a:off x="2216729" y="-13855"/>
             <a:ext cx="2286000" cy="2286000"/>
           </a:xfrm>
           <a:prstGeom prst="rect">
@@ -3064,7 +3064,7 @@
         </p:blipFill>
         <p:spPr>
           <a:xfrm>
-            <a:off x="4502729" y="0"/>
+            <a:off x="4502729" y="-13855"/>
             <a:ext cx="2286000" cy="2286000"/>
           </a:xfrm>
           <a:prstGeom prst="rect">
@@ -3184,7 +3184,7 @@
         </p:blipFill>
         <p:spPr>
           <a:xfrm>
-            <a:off x="-3466" y="4572000"/>
+            <a:off x="-3466" y="4613565"/>
             <a:ext cx="2286000" cy="2286000"/>
           </a:xfrm>
           <a:prstGeom prst="rect">
@@ -3214,7 +3214,7 @@
         </p:blipFill>
         <p:spPr>
           <a:xfrm>
-            <a:off x="2317166" y="4572000"/>
+            <a:off x="2317166" y="4613565"/>
             <a:ext cx="2286000" cy="2286000"/>
           </a:xfrm>
           <a:prstGeom prst="rect">
@@ -3244,7 +3244,7 @@
         </p:blipFill>
         <p:spPr>
           <a:xfrm>
-            <a:off x="4634336" y="4572000"/>
+            <a:off x="4634336" y="4613565"/>
             <a:ext cx="2286000" cy="2286000"/>
           </a:xfrm>
           <a:prstGeom prst="rect">
@@ -3274,7 +3274,7 @@
         </p:blipFill>
         <p:spPr>
           <a:xfrm>
-            <a:off x="27704" y="6761018"/>
+            <a:off x="27704" y="6844148"/>
             <a:ext cx="2286000" cy="2286000"/>
           </a:xfrm>
           <a:prstGeom prst="rect">
@@ -3304,7 +3304,7 @@
         </p:blipFill>
         <p:spPr>
           <a:xfrm>
-            <a:off x="2282534" y="6761018"/>
+            <a:off x="2282534" y="6844148"/>
             <a:ext cx="2286000" cy="2286000"/>
           </a:xfrm>
           <a:prstGeom prst="rect">
@@ -3334,7 +3334,7 @@
         </p:blipFill>
         <p:spPr>
           <a:xfrm>
-            <a:off x="4634348" y="6761018"/>
+            <a:off x="4634348" y="6844148"/>
             <a:ext cx="2286000" cy="2286000"/>
           </a:xfrm>
           <a:prstGeom prst="rect">
@@ -3342,6 +3342,158 @@
           </a:prstGeom>
         </p:spPr>
       </p:pic>
+      <p:sp>
+        <p:nvSpPr>
+          <p:cNvPr id="2" name="TextBox 1">
+            <a:extLst>
+              <a:ext uri="{FF2B5EF4-FFF2-40B4-BE49-F238E27FC236}">
+                <a16:creationId xmlns:a16="http://schemas.microsoft.com/office/drawing/2014/main" id="{27156E95-761A-1484-3743-6CA7C4E8A2AE}"/>
+              </a:ext>
+            </a:extLst>
+          </p:cNvPr>
+          <p:cNvSpPr txBox="1"/>
+          <p:nvPr/>
+        </p:nvSpPr>
+        <p:spPr>
+          <a:xfrm>
+            <a:off x="193961" y="27925"/>
+            <a:ext cx="4990469" cy="276999"/>
+          </a:xfrm>
+          <a:prstGeom prst="rect">
+            <a:avLst/>
+          </a:prstGeom>
+          <a:noFill/>
+        </p:spPr>
+        <p:txBody>
+          <a:bodyPr wrap="none" rtlCol="0">
+            <a:spAutoFit/>
+          </a:bodyPr>
+          <a:lstStyle/>
+          <a:p>
+            <a:r>
+              <a:rPr lang="en-US" sz="1200" dirty="0">
+                <a:latin typeface="Andale Mono" panose="020B0509000000000004" pitchFamily="49" charset="0"/>
+                <a:cs typeface="Times New Roman" panose="02020603050405020304" pitchFamily="18" charset="0"/>
+              </a:rPr>
+              <a:t>a)                      b)       			     c)</a:t>
+            </a:r>
+          </a:p>
+        </p:txBody>
+      </p:sp>
+      <p:sp>
+        <p:nvSpPr>
+          <p:cNvPr id="3" name="TextBox 2">
+            <a:extLst>
+              <a:ext uri="{FF2B5EF4-FFF2-40B4-BE49-F238E27FC236}">
+                <a16:creationId xmlns:a16="http://schemas.microsoft.com/office/drawing/2014/main" id="{DB4EECE9-7EB9-76EF-8855-0160079888FD}"/>
+              </a:ext>
+            </a:extLst>
+          </p:cNvPr>
+          <p:cNvSpPr txBox="1"/>
+          <p:nvPr/>
+        </p:nvSpPr>
+        <p:spPr>
+          <a:xfrm>
+            <a:off x="196456" y="2327900"/>
+            <a:ext cx="4990469" cy="276999"/>
+          </a:xfrm>
+          <a:prstGeom prst="rect">
+            <a:avLst/>
+          </a:prstGeom>
+          <a:noFill/>
+        </p:spPr>
+        <p:txBody>
+          <a:bodyPr wrap="none" rtlCol="0">
+            <a:spAutoFit/>
+          </a:bodyPr>
+          <a:lstStyle/>
+          <a:p>
+            <a:r>
+              <a:rPr lang="en-US" sz="1200" dirty="0">
+                <a:latin typeface="Andale Mono" panose="020B0509000000000004" pitchFamily="49" charset="0"/>
+                <a:cs typeface="Times New Roman" panose="02020603050405020304" pitchFamily="18" charset="0"/>
+              </a:rPr>
+              <a:t>d)                      e)       			     f)</a:t>
+            </a:r>
+          </a:p>
+        </p:txBody>
+      </p:sp>
+      <p:sp>
+        <p:nvSpPr>
+          <p:cNvPr id="4" name="TextBox 3">
+            <a:extLst>
+              <a:ext uri="{FF2B5EF4-FFF2-40B4-BE49-F238E27FC236}">
+                <a16:creationId xmlns:a16="http://schemas.microsoft.com/office/drawing/2014/main" id="{FE5030E9-78C0-D10B-6CE5-6A0CDE416BE2}"/>
+              </a:ext>
+            </a:extLst>
+          </p:cNvPr>
+          <p:cNvSpPr txBox="1"/>
+          <p:nvPr/>
+        </p:nvSpPr>
+        <p:spPr>
+          <a:xfrm>
+            <a:off x="198951" y="4655585"/>
+            <a:ext cx="4990469" cy="276999"/>
+          </a:xfrm>
+          <a:prstGeom prst="rect">
+            <a:avLst/>
+          </a:prstGeom>
+          <a:noFill/>
+        </p:spPr>
+        <p:txBody>
+          <a:bodyPr wrap="none" rtlCol="0">
+            <a:spAutoFit/>
+          </a:bodyPr>
+          <a:lstStyle/>
+          <a:p>
+            <a:r>
+              <a:rPr lang="en-US" sz="1200" dirty="0">
+                <a:latin typeface="Andale Mono" panose="020B0509000000000004" pitchFamily="49" charset="0"/>
+                <a:cs typeface="Times New Roman" panose="02020603050405020304" pitchFamily="18" charset="0"/>
+              </a:rPr>
+              <a:t>g)                       h)       			     i)</a:t>
+            </a:r>
+          </a:p>
+        </p:txBody>
+      </p:sp>
+      <p:sp>
+        <p:nvSpPr>
+          <p:cNvPr id="6" name="TextBox 5">
+            <a:extLst>
+              <a:ext uri="{FF2B5EF4-FFF2-40B4-BE49-F238E27FC236}">
+                <a16:creationId xmlns:a16="http://schemas.microsoft.com/office/drawing/2014/main" id="{0D6E5D52-2F7C-766F-4B1E-297D09C7418F}"/>
+              </a:ext>
+            </a:extLst>
+          </p:cNvPr>
+          <p:cNvSpPr txBox="1"/>
+          <p:nvPr/>
+        </p:nvSpPr>
+        <p:spPr>
+          <a:xfrm>
+            <a:off x="201446" y="6886285"/>
+            <a:ext cx="4990469" cy="276999"/>
+          </a:xfrm>
+          <a:prstGeom prst="rect">
+            <a:avLst/>
+          </a:prstGeom>
+          <a:noFill/>
+        </p:spPr>
+        <p:txBody>
+          <a:bodyPr wrap="none" rtlCol="0">
+            <a:spAutoFit/>
+          </a:bodyPr>
+          <a:lstStyle/>
+          <a:p>
+            <a:r>
+              <a:rPr lang="en-US" sz="1200" dirty="0">
+                <a:latin typeface="Andale Mono" panose="020B0509000000000004" pitchFamily="49" charset="0"/>
+                <a:cs typeface="Times New Roman" panose="02020603050405020304" pitchFamily="18" charset="0"/>
+              </a:rPr>
+              <a:t>j)                       k)       			     l)</a:t>
+            </a:r>
+          </a:p>
+        </p:txBody>
+      </p:sp>
     </p:spTree>
     <p:extLst>
       <p:ext uri="{BB962C8B-B14F-4D97-AF65-F5344CB8AC3E}">

</xml_diff>